<commit_message>
add start of tra then graph
</commit_message>
<xml_diff>
--- a/result/Cap dix- F100140085F1result.pptx
+++ b/result/Cap dix- F100140085F1result.pptx
@@ -4143,7 +4143,7 @@
                 <a:ea typeface="+mn-ea"/>
                 <a:cs typeface="+mn-cs"/>
               </a:rPr>
-              <a:t>ou égal à 100% , ou si à la date de constatation finale(¹), l’action la moins performante clôture à un cours supérieur ou égal à 60% de son Cours Initial</a:t>
+              <a:t>ou égal à 100% , ou si à la date de constatation finale(¹), l’action la moins performante clôture à un cours supérieur ou égal à 80% de son Cours Initial</a:t>
             </a:r>
             <a:r>
               <a:rPr kumimoji="0" lang="fr-FR" sz="800" b="0" i="0" u="none" strike="noStrike" kern="1200" cap="none" spc="0" normalizeH="0" baseline="0" noProof="0" dirty="0">
@@ -4605,7 +4605,7 @@
         <p:spPr>
           <a:xfrm>
             <a:off x="0" y="6172200"/>
-            <a:ext cx="4800600" cy="2625328"/>
+            <a:ext cx="6400800" cy="3500438"/>
           </a:xfrm>
           <a:prstGeom prst="rect">
             <a:avLst/>
@@ -6078,7 +6078,7 @@
                   <a:schemeClr val="tx2"/>
                 </a:solidFill>
               </a:rPr>
-              <a:t>clôture à un cours supérieur ou égal à 60% de son Cours Initial, l’investisseur reçoit, le 27/03/2028</a:t>
+              <a:t>clôture à un cours supérieur ou égal à 80% de son Cours Initial, l’investisseur reçoit, le 27/03/2028</a:t>
             </a:r>
             <a:r>
               <a:rPr lang="fr-FR" sz="800" b="1" baseline="30000" dirty="0">
@@ -7086,6 +7086,256 @@
                 <a:latin typeface="+mn-lt"/>
               </a:rPr>
               <a:t>Mécanisme de remboursement anticipé automatique</a:t>
+            </a:r>
+          </a:p>
+        </p:txBody>
+      </p:sp>
+      <p:sp>
+        <p:nvSpPr>
+          <p:cNvPr id="20" name="Espace réservé du texte 36">
+            <a:extLst>
+              <a:ext uri="{FF2B5EF4-FFF2-40B4-BE49-F238E27FC236}">
+                <a16:creationId xmlns:a16="http://schemas.microsoft.com/office/drawing/2014/main" id="{CF055AA2-377C-446F-B61D-3E7B366770C3}"/>
+              </a:ext>
+            </a:extLst>
+          </p:cNvPr>
+          <p:cNvSpPr txBox="1">
+            <a:spLocks/>
+          </p:cNvSpPr>
+          <p:nvPr/>
+        </p:nvSpPr>
+        <p:spPr>
+          <a:xfrm>
+            <a:off x="1273632" y="7611631"/>
+            <a:ext cx="5029482" cy="391628"/>
+          </a:xfrm>
+          <a:prstGeom prst="rect">
+            <a:avLst/>
+          </a:prstGeom>
+          <a:noFill/>
+          <a:ln w="6350">
+            <a:solidFill>
+              <a:srgbClr val="B9A049"/>
+            </a:solidFill>
+          </a:ln>
+        </p:spPr>
+        <p:txBody>
+          <a:bodyPr lIns="108000" tIns="72000" rIns="108000" bIns="72000" anchor="ctr">
+            <a:spAutoFit/>
+          </a:bodyPr>
+          <a:lstStyle>
+            <a:lvl1pPr indent="0" algn="ctr" defTabSz="755934">
+              <a:lnSpc>
+                <a:spcPct val="100000"/>
+              </a:lnSpc>
+              <a:spcBef>
+                <a:spcPts val="0"/>
+              </a:spcBef>
+              <a:buFont typeface="Arial" panose="020B0604020202020204" pitchFamily="34" charset="0"/>
+              <a:buNone/>
+              <a:defRPr sz="900" b="0" cap="none" baseline="0">
+                <a:solidFill>
+                  <a:schemeClr val="tx2"/>
+                </a:solidFill>
+                <a:latin typeface="Proxima Nova Rg" panose="02000506030000020004" pitchFamily="2" charset="0"/>
+                <a:cs typeface="Gotham Bold" pitchFamily="50" charset="0"/>
+              </a:defRPr>
+            </a:lvl1pPr>
+            <a:lvl2pPr marL="179388" indent="0" defTabSz="755934">
+              <a:lnSpc>
+                <a:spcPct val="100000"/>
+              </a:lnSpc>
+              <a:spcBef>
+                <a:spcPts val="900"/>
+              </a:spcBef>
+              <a:buFont typeface="Arial" panose="020B0604020202020204" pitchFamily="34" charset="0"/>
+              <a:buNone/>
+              <a:defRPr sz="1200" cap="all" baseline="0">
+                <a:latin typeface="Gotham Medium" pitchFamily="50" charset="0"/>
+                <a:cs typeface="Gotham Medium" pitchFamily="50" charset="0"/>
+              </a:defRPr>
+            </a:lvl2pPr>
+            <a:lvl3pPr marL="179388" indent="0" defTabSz="755934">
+              <a:lnSpc>
+                <a:spcPct val="100000"/>
+              </a:lnSpc>
+              <a:spcBef>
+                <a:spcPts val="600"/>
+              </a:spcBef>
+              <a:buFont typeface="Arial" panose="020B0604020202020204" pitchFamily="34" charset="0"/>
+              <a:buNone/>
+              <a:defRPr sz="900">
+                <a:solidFill>
+                  <a:schemeClr val="tx2"/>
+                </a:solidFill>
+              </a:defRPr>
+            </a:lvl3pPr>
+            <a:lvl4pPr marL="179388" indent="0" defTabSz="755934">
+              <a:lnSpc>
+                <a:spcPct val="100000"/>
+              </a:lnSpc>
+              <a:spcBef>
+                <a:spcPts val="600"/>
+              </a:spcBef>
+              <a:buFont typeface="Arial" panose="020B0604020202020204" pitchFamily="34" charset="0"/>
+              <a:buNone/>
+              <a:defRPr sz="900" u="sng">
+                <a:solidFill>
+                  <a:schemeClr val="tx2"/>
+                </a:solidFill>
+              </a:defRPr>
+            </a:lvl4pPr>
+            <a:lvl5pPr marL="179388" indent="0" defTabSz="755934">
+              <a:lnSpc>
+                <a:spcPct val="100000"/>
+              </a:lnSpc>
+              <a:spcBef>
+                <a:spcPts val="600"/>
+              </a:spcBef>
+              <a:buFont typeface="Arial" panose="020B0604020202020204" pitchFamily="34" charset="0"/>
+              <a:buNone/>
+              <a:defRPr sz="700">
+                <a:solidFill>
+                  <a:schemeClr val="tx2"/>
+                </a:solidFill>
+                <a:latin typeface="Ciutadella Regular Italic" panose="01000000000000000000" pitchFamily="50" charset="0"/>
+              </a:defRPr>
+            </a:lvl5pPr>
+            <a:lvl6pPr marL="2078820" indent="-188984" defTabSz="755934">
+              <a:lnSpc>
+                <a:spcPct val="90000"/>
+              </a:lnSpc>
+              <a:spcBef>
+                <a:spcPts val="413"/>
+              </a:spcBef>
+              <a:buFont typeface="Arial" panose="020B0604020202020204" pitchFamily="34" charset="0"/>
+              <a:buChar char="•"/>
+              <a:defRPr sz="1488"/>
+            </a:lvl6pPr>
+            <a:lvl7pPr marL="2456787" indent="-188984" defTabSz="755934">
+              <a:lnSpc>
+                <a:spcPct val="90000"/>
+              </a:lnSpc>
+              <a:spcBef>
+                <a:spcPts val="413"/>
+              </a:spcBef>
+              <a:buFont typeface="Arial" panose="020B0604020202020204" pitchFamily="34" charset="0"/>
+              <a:buChar char="•"/>
+              <a:defRPr sz="1488"/>
+            </a:lvl7pPr>
+            <a:lvl8pPr marL="2834754" indent="-188984" defTabSz="755934">
+              <a:lnSpc>
+                <a:spcPct val="90000"/>
+              </a:lnSpc>
+              <a:spcBef>
+                <a:spcPts val="413"/>
+              </a:spcBef>
+              <a:buFont typeface="Arial" panose="020B0604020202020204" pitchFamily="34" charset="0"/>
+              <a:buChar char="•"/>
+              <a:defRPr sz="1488"/>
+            </a:lvl8pPr>
+            <a:lvl9pPr marL="3212722" indent="-188984" defTabSz="755934">
+              <a:lnSpc>
+                <a:spcPct val="90000"/>
+              </a:lnSpc>
+              <a:spcBef>
+                <a:spcPts val="413"/>
+              </a:spcBef>
+              <a:buFont typeface="Arial" panose="020B0604020202020204" pitchFamily="34" charset="0"/>
+              <a:buChar char="•"/>
+              <a:defRPr sz="1488"/>
+            </a:lvl9pPr>
+          </a:lstStyle>
+          <a:p>
+            <a:r>
+              <a:rPr lang="fr-FR" sz="800" dirty="0">
+                <a:latin typeface="+mn-lt"/>
+              </a:rPr>
+              <a:t>L’intégralité du capital initial</a:t>
+            </a:r>
+          </a:p>
+          <a:p>
+            <a:r>
+              <a:rPr lang="fr-FR" sz="800" dirty="0">
+                <a:latin typeface="+mn-lt"/>
+              </a:rPr>
+              <a:t>(Soit un Taux de Rendement Annuel net de -1,00%</a:t>
+            </a:r>
+            <a:r>
+              <a:rPr lang="fr-FR" sz="800" baseline="30000" dirty="0">
+                <a:latin typeface="+mn-lt"/>
+              </a:rPr>
+              <a:t>(2)</a:t>
+            </a:r>
+            <a:r>
+              <a:rPr lang="fr-FR" sz="800" dirty="0">
+                <a:latin typeface="+mn-lt"/>
+              </a:rPr>
+              <a:t>)</a:t>
+            </a:r>
+          </a:p>
+        </p:txBody>
+      </p:sp>
+      <p:sp>
+        <p:nvSpPr>
+          <p:cNvPr id="21" name="ZoneTexte 20">
+            <a:extLst>
+              <a:ext uri="{FF2B5EF4-FFF2-40B4-BE49-F238E27FC236}">
+                <a16:creationId xmlns:a16="http://schemas.microsoft.com/office/drawing/2014/main" id="{13C1DC08-7523-4CEB-8E89-DD7A3070EE79}"/>
+              </a:ext>
+            </a:extLst>
+          </p:cNvPr>
+          <p:cNvSpPr txBox="1"/>
+          <p:nvPr/>
+        </p:nvSpPr>
+        <p:spPr>
+          <a:xfrm>
+            <a:off x="904289" y="7103339"/>
+            <a:ext cx="6353527" cy="246221"/>
+          </a:xfrm>
+          <a:prstGeom prst="rect">
+            <a:avLst/>
+          </a:prstGeom>
+          <a:noFill/>
+        </p:spPr>
+        <p:txBody>
+          <a:bodyPr wrap="square" lIns="0" tIns="0" rIns="0" bIns="0" rtlCol="0">
+            <a:spAutoFit/>
+          </a:bodyPr>
+          <a:lstStyle/>
+          <a:p>
+            <a:pPr algn="just"/>
+            <a:r>
+              <a:rPr lang="fr-FR" sz="800" b="1" u="sng" dirty="0">
+                <a:solidFill>
+                  <a:srgbClr val="000000"/>
+                </a:solidFill>
+              </a:rPr>
+              <a:t>Cas médian</a:t>
+            </a:r>
+            <a:r>
+              <a:rPr lang="fr-FR" sz="800" b="1" dirty="0">
+                <a:solidFill>
+                  <a:srgbClr val="000000"/>
+                </a:solidFill>
+              </a:rPr>
+              <a:t> : Si </a:t>
+            </a:r>
+            <a:r>
+              <a:rPr lang="it-IT" sz="800" b="1" dirty="0">
+                <a:solidFill>
+                  <a:schemeClr val="tx2"/>
+                </a:solidFill>
+              </a:rPr>
+              <a:t>l’action la moins performante </a:t>
+            </a:r>
+            <a:r>
+              <a:rPr lang="fr-FR" sz="800" b="1" dirty="0">
+                <a:solidFill>
+                  <a:srgbClr val="000000"/>
+                </a:solidFill>
+              </a:rPr>
+              <a:t>clôture à un cours strictement inférieur à 80% mais supérieur ou égal à 60% de son Cours Initial, l’investisseur reçoit, le 27/03/2028 : </a:t>
             </a:r>
           </a:p>
         </p:txBody>
@@ -7892,7 +8142,7 @@
                   <a:srgbClr val="000000"/>
                 </a:solidFill>
               </a:rPr>
-              <a:t>, si le mécanisme de remboursement anticipé n’a pas été activé au préalable, et si l’action la moins performante clôture à un cours supérieur ou égal à 60% de son Cours Initial, l’investisseur récupère alors l’intégralité de son capital initial, majorée d’un gain de 2,25% par trimestre écoulé depuis le 11/03/2022</a:t>
+              <a:t>, si le mécanisme de remboursement anticipé n’a pas été activé au préalable, et si l’action la moins performante clôture à un cours supérieur ou égal à 80% de son Cours Initial, l’investisseur récupère alors l’intégralité de son capital initial, majorée d’un gain de 2,25% par trimestre écoulé depuis le 11/03/2022</a:t>
             </a:r>
             <a:r>
               <a:rPr lang="fr-FR" sz="800" baseline="30000" dirty="0">
@@ -7945,7 +8195,7 @@
                   <a:srgbClr val="000000"/>
                 </a:solidFill>
               </a:rPr>
-              <a:t>). Le capital n’est donc exposé à un risque de perte à l’échéance(¹) que si l’action la moins performante clôture à un cours strictement inférieur à 60% de son Cours Initial à la date de constatation finale(1).</a:t>
+              <a:t>). </a:t>
             </a:r>
           </a:p>
           <a:p>
@@ -7968,7 +8218,7 @@
                   <a:srgbClr val="00FFFF"/>
                 </a:highlight>
               </a:rPr>
-              <a:t/>
+              <a:t>Sinon, si le mécanisme automatique de remboursement anticipé n’a pas été activé au préalable et si, à la date de constatation finale(1), l’action la moins performante clôture à un cours strictement inférieur à 80% de son Cours Initial mais supérieur ou égal à 60% de ce dernier, l’investisseur récupère l’intégralité de son capital initialement investi. Le capital n’est donc exposé à un risque de perte à l’échéance(1) que si l’action la moins performante clôture à un cours strictement inférieur à 60% de son Cours Initial à la date de constatation finale(1).</a:t>
             </a:r>
             <a:endParaRPr lang="fr-FR" sz="800" dirty="0">
               <a:solidFill>
@@ -8343,7 +8593,7 @@
                 <a:effectLst/>
                 <a:ea typeface="Calibri" panose="020F0502020204030204" pitchFamily="34" charset="0"/>
               </a:rPr>
-              <a:t>en cours de vie, et des seuils de 60% et 60% de son Cours Initial à la date de constatation finale</a:t>
+              <a:t>en cours de vie, et des seuils de 80% et 60% de son Cours Initial à la date de constatation finale</a:t>
             </a:r>
             <a:r>
               <a:rPr lang="fr-FR" sz="800" b="1" baseline="30000" dirty="0">
@@ -9330,7 +9580,7 @@
               <a:rPr lang="fr-FR" sz="800" b="0" dirty="0">
                 <a:latin typeface="+mn-lt"/>
               </a:rPr>
-              <a:t>À la date de constatation finale(¹), l’action la moins performante clôture à un cours strictement supérieur à 60% de son Cours Initial</a:t>
+              <a:t>À la date de constatation finale(¹), l’action la moins performante clôture à un cours strictement inférieur à 80% mais supérieur ou égal à 60% de son Cours Initial</a:t>
             </a:r>
           </a:p>
         </p:txBody>
@@ -9606,7 +9856,7 @@
                 </a:solidFill>
                 <a:latin typeface="+mn-lt"/>
               </a:rPr>
-              <a:t>LE RENDEMENT DU PRODUIT « Cap dix » EST TRÈS SENSIBLE À UNE FAIBLE VARIATION DU cours DE CLÔTURE de l'action la moins performante AUTOUR DES SEUILS DE 60% ET DE 60% </a:t>
+              <a:t>LE RENDEMENT DU PRODUIT « Cap dix » EST TRÈS SENSIBLE À UNE FAIBLE VARIATION DU cours DE CLÔTURE de l'action la moins performante AUTOUR DES SEUILS DE 80% ET DE 60% </a:t>
             </a:r>
             <a:r>
               <a:rPr lang="fr-FR" sz="800" cap="all" dirty="0">
@@ -9924,7 +10174,8 @@
               <a:rPr lang="fr-FR" sz="800" dirty="0">
                 <a:latin typeface="+mn-lt"/>
               </a:rPr>
-              <a:t>À la date de constatation finale(¹), l’action la moins performante clôture à un cours strictement supérieur à 60% de son Cours Initial (70% dans cet exemple). L’investisseur récupère alors l’intégralité de son capital initialement investi majorée d’un gain de 2,25% par trimestre écoulé depuis le 2022-03-11 (soit un gain total de 54% total ).</a:t>
+              <a:t>À la date de constatation finale(¹), l’action la moins performante clôture à un cours strictement inférieur à 80% de son Cours Initial (70% dans cet exemple). L’investisseur récupère alors l’intégralité de son capital initialement investi.
+        </a:t>
             </a:r>
           </a:p>
           <a:p>
@@ -10359,13 +10610,35 @@
           <a:lstStyle/>
           <a:p>
             <a:r>
-              <a:rPr lang="fr-FR"/>
-              <a:t>&lt;graph2&gt;</a:t>
-            </a:r>
-            <a:endParaRPr lang="en-US" dirty="0"/>
+              <a:t>&gt;</a:t>
+            </a:r>
           </a:p>
         </p:txBody>
       </p:sp>
+      <p:pic>
+        <p:nvPicPr>
+          <p:cNvPr id="68" name="Picture 67" descr="graph2.png"/>
+          <p:cNvPicPr>
+            <a:picLocks noChangeAspect="1"/>
+          </p:cNvPicPr>
+          <p:nvPr/>
+        </p:nvPicPr>
+        <p:blipFill>
+          <a:blip r:embed="rId2"/>
+          <a:stretch>
+            <a:fillRect/>
+          </a:stretch>
+        </p:blipFill>
+        <p:spPr>
+          <a:xfrm>
+            <a:off x="0" y="1828800"/>
+            <a:ext cx="3886200" cy="1873704"/>
+          </a:xfrm>
+          <a:prstGeom prst="rect">
+            <a:avLst/>
+          </a:prstGeom>
+        </p:spPr>
+      </p:pic>
     </p:spTree>
     <p:extLst>
       <p:ext uri="{BB962C8B-B14F-4D97-AF65-F5344CB8AC3E}">
@@ -11989,15 +12262,33 @@
             <a:spAutoFit/>
           </a:bodyPr>
           <a:lstStyle/>
-          <a:p>
-            <a:r>
-              <a:rPr lang="fr-FR" dirty="0"/>
-              <a:t>&lt;graph5&gt;</a:t>
-            </a:r>
-            <a:endParaRPr lang="en-US" dirty="0"/>
-          </a:p>
+          <a:p/>
         </p:txBody>
       </p:sp>
+      <p:pic>
+        <p:nvPicPr>
+          <p:cNvPr id="18" name="Picture 17" descr="graph2.png"/>
+          <p:cNvPicPr>
+            <a:picLocks noChangeAspect="1"/>
+          </p:cNvPicPr>
+          <p:nvPr/>
+        </p:nvPicPr>
+        <p:blipFill>
+          <a:blip r:embed="rId2"/>
+          <a:stretch>
+            <a:fillRect/>
+          </a:stretch>
+        </p:blipFill>
+        <p:spPr>
+          <a:xfrm>
+            <a:off x="0" y="4800600"/>
+            <a:ext cx="6400800" cy="3086100"/>
+          </a:xfrm>
+          <a:prstGeom prst="rect">
+            <a:avLst/>
+          </a:prstGeom>
+        </p:spPr>
+      </p:pic>
     </p:spTree>
     <p:extLst>
       <p:ext uri="{BB962C8B-B14F-4D97-AF65-F5344CB8AC3E}">
@@ -15645,7 +15936,7 @@
                     <a:lstStyle/>
                     <a:p>
                       <a:r>
-                        <a:t>60% du Cours Initial de l'action la moins performante</a:t>
+                        <a:t>80% du Cours Initial de l'action la moins performante</a:t>
                       </a:r>
                     </a:p>
                   </a:txBody>

</xml_diff>